<commit_message>
Update to Powerpoint and Report Overview added
</commit_message>
<xml_diff>
--- a/Capstone Presentation.pptx
+++ b/Capstone Presentation.pptx
@@ -112,7 +112,7 @@
   </p:defaultTextStyle>
   <p:extLst>
     <p:ext uri="{EFAFB233-063F-42B5-8137-9DF3F51BA10A}">
-      <p15:sldGuideLst xmlns:p15="http://schemas.microsoft.com/office/powerpoint/2012/main" xmlns=""/>
+      <p15:sldGuideLst xmlns="" xmlns:p15="http://schemas.microsoft.com/office/powerpoint/2012/main"/>
     </p:ext>
   </p:extLst>
 </p:presentation>
@@ -305,7 +305,7 @@
             <a:fld id="{4AAD347D-5ACD-4C99-B74B-A9C85AD731AF}" type="datetimeFigureOut">
               <a:rPr lang="en-US" dirty="0"/>
               <a:pPr/>
-              <a:t>5/30/2021</a:t>
+              <a:t>5/31/2021</a:t>
             </a:fld>
             <a:endParaRPr lang="en-US" dirty="0"/>
           </a:p>
@@ -577,7 +577,7 @@
             <a:fld id="{4509A250-FF31-4206-8172-F9D3106AACB1}" type="datetimeFigureOut">
               <a:rPr lang="en-US" dirty="0"/>
               <a:pPr/>
-              <a:t>5/30/2021</a:t>
+              <a:t>5/31/2021</a:t>
             </a:fld>
             <a:endParaRPr lang="en-US" dirty="0"/>
           </a:p>
@@ -768,7 +768,7 @@
             <a:fld id="{4509A250-FF31-4206-8172-F9D3106AACB1}" type="datetimeFigureOut">
               <a:rPr lang="en-US" dirty="0"/>
               <a:pPr/>
-              <a:t>5/30/2021</a:t>
+              <a:t>5/31/2021</a:t>
             </a:fld>
             <a:endParaRPr lang="en-US" dirty="0"/>
           </a:p>
@@ -1038,7 +1038,7 @@
             <a:fld id="{4509A250-FF31-4206-8172-F9D3106AACB1}" type="datetimeFigureOut">
               <a:rPr lang="en-US" dirty="0"/>
               <a:pPr/>
-              <a:t>5/30/2021</a:t>
+              <a:t>5/31/2021</a:t>
             </a:fld>
             <a:endParaRPr lang="en-US" dirty="0"/>
           </a:p>
@@ -1376,7 +1376,7 @@
             <a:fld id="{4509A250-FF31-4206-8172-F9D3106AACB1}" type="datetimeFigureOut">
               <a:rPr lang="en-US" dirty="0"/>
               <a:pPr/>
-              <a:t>5/30/2021</a:t>
+              <a:t>5/31/2021</a:t>
             </a:fld>
             <a:endParaRPr lang="en-US" dirty="0"/>
           </a:p>
@@ -1996,7 +1996,7 @@
             <a:fld id="{4509A250-FF31-4206-8172-F9D3106AACB1}" type="datetimeFigureOut">
               <a:rPr lang="en-US" dirty="0"/>
               <a:pPr/>
-              <a:t>5/30/2021</a:t>
+              <a:t>5/31/2021</a:t>
             </a:fld>
             <a:endParaRPr lang="en-US" dirty="0"/>
           </a:p>
@@ -2853,7 +2853,7 @@
             <a:fld id="{4509A250-FF31-4206-8172-F9D3106AACB1}" type="datetimeFigureOut">
               <a:rPr lang="en-US" dirty="0"/>
               <a:pPr/>
-              <a:t>5/30/2021</a:t>
+              <a:t>5/31/2021</a:t>
             </a:fld>
             <a:endParaRPr lang="en-US" dirty="0"/>
           </a:p>
@@ -3020,7 +3020,7 @@
             <a:fld id="{4509A250-FF31-4206-8172-F9D3106AACB1}" type="datetimeFigureOut">
               <a:rPr lang="en-US" dirty="0"/>
               <a:pPr/>
-              <a:t>5/30/2021</a:t>
+              <a:t>5/31/2021</a:t>
             </a:fld>
             <a:endParaRPr lang="en-US" dirty="0"/>
           </a:p>
@@ -3197,7 +3197,7 @@
             <a:fld id="{4509A250-FF31-4206-8172-F9D3106AACB1}" type="datetimeFigureOut">
               <a:rPr lang="en-US" dirty="0"/>
               <a:pPr/>
-              <a:t>5/30/2021</a:t>
+              <a:t>5/31/2021</a:t>
             </a:fld>
             <a:endParaRPr lang="en-US" dirty="0"/>
           </a:p>
@@ -3364,7 +3364,7 @@
             <a:fld id="{4509A250-FF31-4206-8172-F9D3106AACB1}" type="datetimeFigureOut">
               <a:rPr lang="en-US" dirty="0"/>
               <a:pPr/>
-              <a:t>5/30/2021</a:t>
+              <a:t>5/31/2021</a:t>
             </a:fld>
             <a:endParaRPr lang="en-US" dirty="0"/>
           </a:p>
@@ -3608,7 +3608,7 @@
             <a:fld id="{9796027F-7875-4030-9381-8BD8C4F21935}" type="datetimeFigureOut">
               <a:rPr lang="en-US" dirty="0"/>
               <a:pPr/>
-              <a:t>5/30/2021</a:t>
+              <a:t>5/31/2021</a:t>
             </a:fld>
             <a:endParaRPr lang="en-US" dirty="0"/>
           </a:p>
@@ -3897,7 +3897,7 @@
             <a:fld id="{9796027F-7875-4030-9381-8BD8C4F21935}" type="datetimeFigureOut">
               <a:rPr lang="en-US" dirty="0"/>
               <a:pPr/>
-              <a:t>5/30/2021</a:t>
+              <a:t>5/31/2021</a:t>
             </a:fld>
             <a:endParaRPr lang="en-US" dirty="0"/>
           </a:p>
@@ -4338,7 +4338,7 @@
             <a:fld id="{9796027F-7875-4030-9381-8BD8C4F21935}" type="datetimeFigureOut">
               <a:rPr lang="en-US" dirty="0"/>
               <a:pPr/>
-              <a:t>5/30/2021</a:t>
+              <a:t>5/31/2021</a:t>
             </a:fld>
             <a:endParaRPr lang="en-US" dirty="0"/>
           </a:p>
@@ -4453,7 +4453,7 @@
             <a:fld id="{4509A250-FF31-4206-8172-F9D3106AACB1}" type="datetimeFigureOut">
               <a:rPr lang="en-US" dirty="0"/>
               <a:pPr/>
-              <a:t>5/30/2021</a:t>
+              <a:t>5/31/2021</a:t>
             </a:fld>
             <a:endParaRPr lang="en-US" dirty="0"/>
           </a:p>
@@ -4545,7 +4545,7 @@
             <a:fld id="{4509A250-FF31-4206-8172-F9D3106AACB1}" type="datetimeFigureOut">
               <a:rPr lang="en-US" dirty="0"/>
               <a:pPr/>
-              <a:t>5/30/2021</a:t>
+              <a:t>5/31/2021</a:t>
             </a:fld>
             <a:endParaRPr lang="en-US" dirty="0"/>
           </a:p>
@@ -4821,7 +4821,7 @@
             <a:fld id="{4509A250-FF31-4206-8172-F9D3106AACB1}" type="datetimeFigureOut">
               <a:rPr lang="en-US" dirty="0"/>
               <a:pPr/>
-              <a:t>5/30/2021</a:t>
+              <a:t>5/31/2021</a:t>
             </a:fld>
             <a:endParaRPr lang="en-US" dirty="0"/>
           </a:p>
@@ -5093,7 +5093,7 @@
             <a:fld id="{4509A250-FF31-4206-8172-F9D3106AACB1}" type="datetimeFigureOut">
               <a:rPr lang="en-US" dirty="0"/>
               <a:pPr/>
-              <a:t>5/30/2021</a:t>
+              <a:t>5/31/2021</a:t>
             </a:fld>
             <a:endParaRPr lang="en-US" dirty="0"/>
           </a:p>
@@ -5184,7 +5184,7 @@
           <a:blip r:embed="rId19">
             <a:extLst>
               <a:ext uri="{28A0092B-C50C-407E-A947-70E740481C1C}">
-                <a14:useLocalDpi xmlns:a14="http://schemas.microsoft.com/office/drawing/2010/main" xmlns="" val="0"/>
+                <a14:useLocalDpi xmlns="" xmlns:a14="http://schemas.microsoft.com/office/drawing/2010/main" val="0"/>
               </a:ext>
             </a:extLst>
           </a:blip>
@@ -5213,7 +5213,7 @@
           <a:blip r:embed="rId20">
             <a:extLst>
               <a:ext uri="{28A0092B-C50C-407E-A947-70E740481C1C}">
-                <a14:useLocalDpi xmlns:a14="http://schemas.microsoft.com/office/drawing/2010/main" xmlns="" val="0"/>
+                <a14:useLocalDpi xmlns="" xmlns:a14="http://schemas.microsoft.com/office/drawing/2010/main" val="0"/>
               </a:ext>
             </a:extLst>
           </a:blip>
@@ -5305,7 +5305,7 @@
           <a:blip r:embed="rId21">
             <a:extLst>
               <a:ext uri="{28A0092B-C50C-407E-A947-70E740481C1C}">
-                <a14:useLocalDpi xmlns:a14="http://schemas.microsoft.com/office/drawing/2010/main" xmlns="" val="0"/>
+                <a14:useLocalDpi xmlns="" xmlns:a14="http://schemas.microsoft.com/office/drawing/2010/main" val="0"/>
               </a:ext>
             </a:extLst>
           </a:blip>
@@ -5334,7 +5334,7 @@
           <a:blip r:embed="rId22">
             <a:extLst>
               <a:ext uri="{28A0092B-C50C-407E-A947-70E740481C1C}">
-                <a14:useLocalDpi xmlns:a14="http://schemas.microsoft.com/office/drawing/2010/main" xmlns="" val="0"/>
+                <a14:useLocalDpi xmlns="" xmlns:a14="http://schemas.microsoft.com/office/drawing/2010/main" val="0"/>
               </a:ext>
             </a:extLst>
           </a:blip>
@@ -5519,7 +5519,7 @@
             <a:fld id="{4AAD347D-5ACD-4C99-B74B-A9C85AD731AF}" type="datetimeFigureOut">
               <a:rPr lang="en-US" dirty="0"/>
               <a:pPr/>
-              <a:t>5/30/2021</a:t>
+              <a:t>5/31/2021</a:t>
             </a:fld>
             <a:endParaRPr lang="en-US" dirty="0"/>
           </a:p>
@@ -6093,7 +6093,7 @@
     </p:spTree>
     <p:extLst>
       <p:ext uri="{BB962C8B-B14F-4D97-AF65-F5344CB8AC3E}">
-        <p14:creationId xmlns:p14="http://schemas.microsoft.com/office/powerpoint/2010/main" xmlns="" val="3900713841"/>
+        <p14:creationId xmlns="" xmlns:p14="http://schemas.microsoft.com/office/powerpoint/2010/main" val="3900713841"/>
       </p:ext>
     </p:extLst>
   </p:cSld>
@@ -6160,51 +6160,11 @@
           <a:p>
             <a:r>
               <a:rPr lang="en-US" dirty="0" smtClean="0"/>
-              <a:t>Local travel company BeGone International is recommending local destinations for </a:t>
-            </a:r>
-            <a:r>
-              <a:rPr lang="en-US" dirty="0" smtClean="0"/>
-              <a:t>New York travelers</a:t>
-            </a:r>
-            <a:r>
-              <a:rPr lang="en-US" dirty="0" smtClean="0"/>
-              <a:t>. </a:t>
-            </a:r>
-            <a:r>
-              <a:rPr lang="en-US" dirty="0" smtClean="0"/>
-              <a:t>Their research </a:t>
-            </a:r>
-            <a:r>
-              <a:rPr lang="en-US" dirty="0" smtClean="0"/>
-              <a:t>resources </a:t>
-            </a:r>
-            <a:r>
-              <a:rPr lang="en-US" dirty="0" smtClean="0"/>
-              <a:t>are evaluating if </a:t>
-            </a:r>
-            <a:r>
-              <a:rPr lang="en-US" dirty="0" smtClean="0"/>
-              <a:t>Toronto would </a:t>
-            </a:r>
-            <a:r>
-              <a:rPr lang="en-US" dirty="0" smtClean="0"/>
-              <a:t>be comparable destination based </a:t>
-            </a:r>
-            <a:r>
-              <a:rPr lang="en-US" dirty="0" smtClean="0"/>
-              <a:t>similarities to Manhattan venues. The </a:t>
-            </a:r>
-            <a:r>
-              <a:rPr lang="en-US" dirty="0" smtClean="0"/>
-              <a:t>company is using data science methodology and analytics to validate </a:t>
-            </a:r>
-            <a:r>
-              <a:rPr lang="en-US" smtClean="0"/>
-              <a:t>their </a:t>
-            </a:r>
-            <a:r>
-              <a:rPr lang="en-US" smtClean="0"/>
-              <a:t>premise.</a:t>
+              <a:t>Local travel company BeGone International is recommending local destinations for New York travelers. Their research resources are evaluating if Toronto would be comparable destination based similarities to Manhattan venues. The company is using data science methodology and analytics to validate </a:t>
+            </a:r>
+            <a:r>
+              <a:rPr lang="en-US" smtClean="0"/>
+              <a:t>their premise.</a:t>
             </a:r>
             <a:endParaRPr lang="en-US" dirty="0"/>
           </a:p>
@@ -6213,7 +6173,7 @@
     </p:spTree>
     <p:extLst>
       <p:ext uri="{BB962C8B-B14F-4D97-AF65-F5344CB8AC3E}">
-        <p14:creationId xmlns:p14="http://schemas.microsoft.com/office/powerpoint/2010/main" xmlns="" val="3272521183"/>
+        <p14:creationId xmlns="" xmlns:p14="http://schemas.microsoft.com/office/powerpoint/2010/main" val="3272521183"/>
       </p:ext>
     </p:extLst>
   </p:cSld>
@@ -6275,12 +6235,38 @@
         </p:nvSpPr>
         <p:spPr/>
         <p:txBody>
-          <a:bodyPr/>
+          <a:bodyPr>
+            <a:normAutofit lnSpcReduction="10000"/>
+          </a:bodyPr>
           <a:lstStyle/>
           <a:p>
             <a:r>
               <a:rPr lang="en-US" dirty="0" smtClean="0"/>
-              <a:t>For this initiative, The research resources are using location data and rating information subscribed from FourSquare. From this data source, data on New York and Toronto venues was acquired. </a:t>
+              <a:t>For this initiative, The research resources are using location data and rating information subscribed </a:t>
+            </a:r>
+            <a:r>
+              <a:rPr lang="en-US" dirty="0" smtClean="0"/>
+              <a:t>from public accessible sources, i.e. </a:t>
+            </a:r>
+            <a:r>
+              <a:rPr lang="en-US" dirty="0" err="1" smtClean="0"/>
+              <a:t>FourSquare</a:t>
+            </a:r>
+            <a:r>
+              <a:rPr lang="en-US" dirty="0" smtClean="0"/>
+              <a:t> </a:t>
+            </a:r>
+            <a:r>
+              <a:rPr lang="en-US" smtClean="0"/>
+              <a:t>and Wikipedia</a:t>
+            </a:r>
+            <a:r>
+              <a:rPr lang="en-US" smtClean="0"/>
+              <a:t>. </a:t>
+            </a:r>
+            <a:r>
+              <a:rPr lang="en-US" dirty="0" smtClean="0"/>
+              <a:t>From this data source, data on New York and Toronto venues was acquired. </a:t>
             </a:r>
             <a:endParaRPr lang="en-US" dirty="0"/>
           </a:p>
@@ -6314,7 +6300,7 @@
     </p:spTree>
     <p:extLst>
       <p:ext uri="{BB962C8B-B14F-4D97-AF65-F5344CB8AC3E}">
-        <p14:creationId xmlns:p14="http://schemas.microsoft.com/office/powerpoint/2010/main" xmlns="" val="1367836491"/>
+        <p14:creationId xmlns="" xmlns:p14="http://schemas.microsoft.com/office/powerpoint/2010/main" val="1367836491"/>
       </p:ext>
     </p:extLst>
   </p:cSld>
@@ -6419,7 +6405,7 @@
     </p:spTree>
     <p:extLst>
       <p:ext uri="{BB962C8B-B14F-4D97-AF65-F5344CB8AC3E}">
-        <p14:creationId xmlns:p14="http://schemas.microsoft.com/office/powerpoint/2010/main" xmlns="" val="2515165929"/>
+        <p14:creationId xmlns="" xmlns:p14="http://schemas.microsoft.com/office/powerpoint/2010/main" val="2515165929"/>
       </p:ext>
     </p:extLst>
   </p:cSld>
@@ -6527,7 +6513,7 @@
     </p:spTree>
     <p:extLst>
       <p:ext uri="{BB962C8B-B14F-4D97-AF65-F5344CB8AC3E}">
-        <p14:creationId xmlns:p14="http://schemas.microsoft.com/office/powerpoint/2010/main" xmlns="" val="1791515232"/>
+        <p14:creationId xmlns="" xmlns:p14="http://schemas.microsoft.com/office/powerpoint/2010/main" val="1791515232"/>
       </p:ext>
     </p:extLst>
   </p:cSld>
@@ -6609,15 +6595,7 @@
           <a:p>
             <a:r>
               <a:rPr lang="en-US" dirty="0" smtClean="0"/>
-              <a:t>The similarities were, in this </a:t>
-            </a:r>
-            <a:r>
-              <a:rPr lang="en-US" dirty="0" smtClean="0"/>
-              <a:t>order: </a:t>
-            </a:r>
-            <a:r>
-              <a:rPr lang="en-US" dirty="0" smtClean="0"/>
-              <a:t>Coffee </a:t>
+              <a:t>The similarities were, in this order: Coffee </a:t>
             </a:r>
             <a:endParaRPr lang="en-US" dirty="0"/>
           </a:p>
@@ -6626,7 +6604,7 @@
     </p:spTree>
     <p:extLst>
       <p:ext uri="{BB962C8B-B14F-4D97-AF65-F5344CB8AC3E}">
-        <p14:creationId xmlns:p14="http://schemas.microsoft.com/office/powerpoint/2010/main" xmlns="" val="619675963"/>
+        <p14:creationId xmlns="" xmlns:p14="http://schemas.microsoft.com/office/powerpoint/2010/main" val="619675963"/>
       </p:ext>
     </p:extLst>
   </p:cSld>
@@ -6699,19 +6677,7 @@
           <a:p>
             <a:r>
               <a:rPr lang="en-US" dirty="0" smtClean="0"/>
-              <a:t>Local travelers from New York may be drawn to Toronto </a:t>
-            </a:r>
-            <a:r>
-              <a:rPr lang="en-US" dirty="0" smtClean="0"/>
-              <a:t>and to explore their </a:t>
-            </a:r>
-            <a:r>
-              <a:rPr lang="en-US" dirty="0" smtClean="0"/>
-              <a:t>interests in coffee </a:t>
-            </a:r>
-            <a:r>
-              <a:rPr lang="en-US" dirty="0" smtClean="0"/>
-              <a:t>shops</a:t>
+              <a:t>Local travelers from New York may be drawn to Toronto and to explore their interests in coffee shops</a:t>
             </a:r>
             <a:endParaRPr lang="en-US" dirty="0"/>
           </a:p>
@@ -6720,7 +6686,7 @@
     </p:spTree>
     <p:extLst>
       <p:ext uri="{BB962C8B-B14F-4D97-AF65-F5344CB8AC3E}">
-        <p14:creationId xmlns:p14="http://schemas.microsoft.com/office/powerpoint/2010/main" xmlns="" val="3722459312"/>
+        <p14:creationId xmlns="" xmlns:p14="http://schemas.microsoft.com/office/powerpoint/2010/main" val="3722459312"/>
       </p:ext>
     </p:extLst>
   </p:cSld>
@@ -6990,7 +6956,7 @@
   <a:extraClrSchemeLst/>
   <a:extLst>
     <a:ext uri="{05A4C25C-085E-4340-85A3-A5531E510DB2}">
-      <thm15:themeFamily xmlns:thm15="http://schemas.microsoft.com/office/thememl/2012/main" xmlns="" name="Ion" id="{B8441ADB-2E43-4AF7-B97A-BD870242C6A8}" vid="{292E63A9-BB86-4E3D-B92A-7223C6510D2E}"/>
+      <thm15:themeFamily xmlns="" xmlns:thm15="http://schemas.microsoft.com/office/thememl/2012/main" name="Ion" id="{B8441ADB-2E43-4AF7-B97A-BD870242C6A8}" vid="{292E63A9-BB86-4E3D-B92A-7223C6510D2E}"/>
     </a:ext>
   </a:extLst>
 </a:theme>

</xml_diff>